<commit_message>
updated lettering for standings.html template
</commit_message>
<xml_diff>
--- a/Project 3.pptx
+++ b/Project 3.pptx
@@ -39035,7 +39035,20 @@
                 <a:effectLst/>
                 <a:latin typeface="Söhne"/>
               </a:rPr>
-              <a:t> offers features such as tracking player data, displaying team statistics, player statistics, NFL scores, and current standings</a:t>
+              <a:t> offers features such as tracking player data, displaying team statistics, player statistics</a:t>
+            </a:r>
+            <a:r>
+              <a:rPr lang="en-US" dirty="0">
+                <a:latin typeface="Söhne"/>
+              </a:rPr>
+              <a:t> </a:t>
+            </a:r>
+            <a:r>
+              <a:rPr lang="en-US" b="0" i="0" dirty="0">
+                <a:effectLst/>
+                <a:latin typeface="Söhne"/>
+              </a:rPr>
+              <a:t>and current standings</a:t>
             </a:r>
           </a:p>
           <a:p>
@@ -39366,11 +39379,11 @@
               <a:buChar char="•"/>
             </a:pPr>
             <a:r>
-              <a:rPr lang="en-US" b="0" i="0">
+              <a:rPr lang="en-US" b="0" i="0" dirty="0">
                 <a:effectLst/>
                 <a:latin typeface="Söhne"/>
               </a:rPr>
-              <a:t>Tracking NFL player data: Our website collects and updates player statistics in real-time.</a:t>
+              <a:t>Tracking NFL player data: Our website collects and updates player statistics.</a:t>
             </a:r>
           </a:p>
           <a:p>
@@ -39379,7 +39392,7 @@
               <a:buChar char="•"/>
             </a:pPr>
             <a:r>
-              <a:rPr lang="en-US" b="0" i="0">
+              <a:rPr lang="en-US" b="0" i="0" dirty="0">
                 <a:effectLst/>
                 <a:latin typeface="Söhne"/>
               </a:rPr>
@@ -39392,11 +39405,11 @@
               <a:buChar char="•"/>
             </a:pPr>
             <a:r>
-              <a:rPr lang="en-US" b="0" i="0">
+              <a:rPr lang="en-US" b="0" i="0" dirty="0">
                 <a:effectLst/>
                 <a:latin typeface="Söhne"/>
               </a:rPr>
-              <a:t>Displaying player statistics: Detailed player profiles with performance metrics and historical data.</a:t>
+              <a:t>Displaying player statistics: Detailed player profiles with performance metrics </a:t>
             </a:r>
           </a:p>
           <a:p>
@@ -39405,11 +39418,11 @@
               <a:buChar char="•"/>
             </a:pPr>
             <a:r>
-              <a:rPr lang="en-US" b="0" i="0">
+              <a:rPr lang="en-US" b="0" i="0" dirty="0">
                 <a:effectLst/>
                 <a:latin typeface="Söhne"/>
               </a:rPr>
-              <a:t>Providing NFL scores: Live scores and game summaries.</a:t>
+              <a:t>Showing current standings: Up-to-date team rankings</a:t>
             </a:r>
           </a:p>
           <a:p>
@@ -39418,34 +39431,15 @@
               <a:buChar char="•"/>
             </a:pPr>
             <a:r>
-              <a:rPr lang="en-US" b="0" i="0">
-                <a:effectLst/>
+              <a:rPr lang="en-US" dirty="0">
                 <a:latin typeface="Söhne"/>
               </a:rPr>
-              <a:t>Showing current standings: Up-to-date team rankings and divisions.</a:t>
+              <a:t>Displaying sports betting data</a:t>
             </a:r>
-          </a:p>
-          <a:p>
-            <a:pPr>
-              <a:buFont typeface="Arial" panose="020B0604020202020204" pitchFamily="34" charset="0"/>
-              <a:buChar char="•"/>
-            </a:pPr>
-            <a:r>
-              <a:rPr lang="en-US">
-                <a:latin typeface="Söhne"/>
-              </a:rPr>
-              <a:t> Displaying sports betting data</a:t>
-            </a:r>
-            <a:endParaRPr lang="en-US" b="0" i="0">
+            <a:endParaRPr lang="en-US" b="0" i="0" dirty="0">
               <a:effectLst/>
               <a:latin typeface="Söhne"/>
             </a:endParaRPr>
-          </a:p>
-          <a:p>
-            <a:r>
-              <a:rPr lang="en-US" dirty="0"/>
-              <a:t>  </a:t>
-            </a:r>
           </a:p>
         </p:txBody>
       </p:sp>
@@ -39756,7 +39750,7 @@
               <a:buChar char="•"/>
             </a:pPr>
             <a:r>
-              <a:rPr lang="en-US" b="0" i="0">
+              <a:rPr lang="en-US" b="0" i="0" dirty="0">
                 <a:effectLst/>
                 <a:latin typeface="Söhne"/>
               </a:rPr>
@@ -39769,7 +39763,7 @@
               <a:buChar char="•"/>
             </a:pPr>
             <a:r>
-              <a:rPr lang="en-US" b="0" i="0">
+              <a:rPr lang="en-US" b="0" i="0" dirty="0">
                 <a:effectLst/>
                 <a:latin typeface="Söhne"/>
               </a:rPr>
@@ -39782,11 +39776,49 @@
               <a:buChar char="•"/>
             </a:pPr>
             <a:r>
+              <a:rPr lang="en-US" b="0" i="0" dirty="0">
+                <a:effectLst/>
+                <a:latin typeface="Söhne"/>
+              </a:rPr>
+              <a:t>Backend development: We built a robust backend system for data tracking and storage </a:t>
+            </a:r>
+            <a:r>
               <a:rPr lang="en-US" b="0" i="0">
                 <a:effectLst/>
                 <a:latin typeface="Söhne"/>
               </a:rPr>
-              <a:t>Backend development: We built a robust backend system for data tracking and storage using Node.js and Express.</a:t>
+              <a:t>using Flask </a:t>
+            </a:r>
+            <a:endParaRPr lang="en-US" b="0" i="0" dirty="0">
+              <a:effectLst/>
+              <a:latin typeface="Söhne"/>
+            </a:endParaRPr>
+          </a:p>
+          <a:p>
+            <a:pPr>
+              <a:buFont typeface="Arial" panose="020B0604020202020204" pitchFamily="34" charset="0"/>
+              <a:buChar char="•"/>
+            </a:pPr>
+            <a:r>
+              <a:rPr lang="en-US" b="0" i="0" dirty="0">
+                <a:effectLst/>
+                <a:latin typeface="Söhne"/>
+              </a:rPr>
+              <a:t>Frontend development: The frontend was developed using D3.js and </a:t>
+            </a:r>
+            <a:r>
+              <a:rPr lang="en-US" b="0" i="0" dirty="0" err="1">
+                <a:effectLst/>
+                <a:latin typeface="Söhne"/>
+              </a:rPr>
+              <a:t>JQuery</a:t>
+            </a:r>
+            <a:r>
+              <a:rPr lang="en-US" b="0" i="0" dirty="0">
+                <a:effectLst/>
+                <a:latin typeface="Söhne"/>
+              </a:rPr>
+              <a:t> for data display and user interaction.</a:t>
             </a:r>
           </a:p>
           <a:p>
@@ -39795,20 +39827,7 @@
               <a:buChar char="•"/>
             </a:pPr>
             <a:r>
-              <a:rPr lang="en-US" b="0" i="0">
-                <a:effectLst/>
-                <a:latin typeface="Söhne"/>
-              </a:rPr>
-              <a:t>Frontend development: The frontend was developed using React for data display and user interaction.</a:t>
-            </a:r>
-          </a:p>
-          <a:p>
-            <a:pPr>
-              <a:buFont typeface="Arial" panose="020B0604020202020204" pitchFamily="34" charset="0"/>
-              <a:buChar char="•"/>
-            </a:pPr>
-            <a:r>
-              <a:rPr lang="en-US" b="0" i="0">
+              <a:rPr lang="en-US" b="0" i="0" dirty="0">
                 <a:effectLst/>
                 <a:latin typeface="Söhne"/>
               </a:rPr>
@@ -39821,7 +39840,7 @@
               <a:buChar char="•"/>
             </a:pPr>
             <a:r>
-              <a:rPr lang="en-US" b="0" i="0">
+              <a:rPr lang="en-US" b="0" i="0" dirty="0">
                 <a:effectLst/>
                 <a:latin typeface="Söhne"/>
               </a:rPr>

</xml_diff>